<commit_message>
Added link to github
</commit_message>
<xml_diff>
--- a/project.pptx
+++ b/project.pptx
@@ -6819,7 +6819,10 @@
           <a:bodyPr/>
           <a:lstStyle/>
           <a:p>
-            <a:endParaRPr lang="en-US"/>
+            <a:r>
+              <a:rPr lang="en-US"/>
+              <a:t>https://github.com/Jacobsma/CS477-Project</a:t>
+            </a:r>
           </a:p>
         </p:txBody>
       </p:sp>

</xml_diff>

<commit_message>
Last minute changes to presentation
</commit_message>
<xml_diff>
--- a/project.pptx
+++ b/project.pptx
@@ -4995,10 +4995,15 @@
                 <p:ph idx="1"/>
               </p:nvPr>
             </p:nvSpPr>
-            <p:spPr/>
+            <p:spPr>
+              <a:xfrm>
+                <a:off x="1202919" y="2011680"/>
+                <a:ext cx="9869408" cy="4206240"/>
+              </a:xfrm>
+            </p:spPr>
             <p:txBody>
               <a:bodyPr>
-                <a:normAutofit fontScale="92500"/>
+                <a:normAutofit fontScale="92500" lnSpcReduction="10000"/>
               </a:bodyPr>
               <a:lstStyle/>
               <a:p>
@@ -5049,7 +5054,7 @@
                 </a:r>
                 <a:r>
                   <a:rPr lang="en-US" dirty="0"/>
-                  <a:t> is a potential path through</a:t>
+                  <a:t> is the set of all the shortest</a:t>
                 </a:r>
               </a:p>
               <a:p>
@@ -5162,7 +5167,15 @@
                 </a:r>
                 <a:r>
                   <a:rPr lang="en-US" dirty="0"/>
-                  <a:t>the remaining states.</a:t>
+                  <a:t>words for each cardinality of </a:t>
+                </a:r>
+                <a:r>
+                  <a:rPr lang="en-US" i="1" dirty="0"/>
+                  <a:t>T</a:t>
+                </a:r>
+                <a:r>
+                  <a:rPr lang="en-US" dirty="0"/>
+                  <a:t>.</a:t>
                 </a:r>
                 <a:endParaRPr lang="en-US" i="1" dirty="0"/>
               </a:p>
@@ -5321,7 +5334,46 @@
                 <a:pPr marL="0" indent="0">
                   <a:buNone/>
                 </a:pPr>
-                <a:endParaRPr lang="en-US" i="1" dirty="0"/>
+                <a:r>
+                  <a:rPr lang="en-US"/>
+                  <a:t>Examples- </a:t>
+                </a:r>
+                <a:r>
+                  <a:rPr lang="en-US" dirty="0"/>
+                  <a:t>	</a:t>
+                </a:r>
+                <a:r>
+                  <a:rPr lang="en-US" i="1" dirty="0"/>
+                  <a:t>P</a:t>
+                </a:r>
+                <a:r>
+                  <a:rPr lang="en-US" dirty="0"/>
+                  <a:t>: ((0, “”) , (1, ”</a:t>
+                </a:r>
+                <a:r>
+                  <a:rPr lang="el-GR" dirty="0"/>
+                  <a:t> β</a:t>
+                </a:r>
+                <a:r>
+                  <a:rPr lang="en-US" dirty="0"/>
+                  <a:t>”), (2, “</a:t>
+                </a:r>
+                <a:r>
+                  <a:rPr lang="el-GR" dirty="0"/>
+                  <a:t>βα</a:t>
+                </a:r>
+                <a:r>
+                  <a:rPr lang="en-US" dirty="0"/>
+                  <a:t>”))	</a:t>
+                </a:r>
+                <a:r>
+                  <a:rPr lang="en-US" i="1" dirty="0"/>
+                  <a:t>T</a:t>
+                </a:r>
+                <a:r>
+                  <a:rPr lang="en-US" dirty="0"/>
+                  <a:t>: (2,3)</a:t>
+                </a:r>
               </a:p>
             </p:txBody>
           </p:sp>
@@ -5344,10 +5396,14 @@
               </p:nvPr>
             </p:nvSpPr>
             <p:spPr>
+              <a:xfrm>
+                <a:off x="1202919" y="2011680"/>
+                <a:ext cx="9869408" cy="4206240"/>
+              </a:xfrm>
               <a:blipFill>
                 <a:blip r:embed="rId2"/>
                 <a:stretch>
-                  <a:fillRect l="-623" t="-1449"/>
+                  <a:fillRect l="-618" t="-2029" r="-865"/>
                 </a:stretch>
               </a:blipFill>
             </p:spPr>
@@ -5424,8 +5480,8 @@
           </a:p>
         </p:txBody>
       </p:sp>
-      <mc:AlternateContent xmlns:mc="http://schemas.openxmlformats.org/markup-compatibility/2006">
-        <mc:Choice xmlns:a14="http://schemas.microsoft.com/office/drawing/2010/main" Requires="a14">
+      <mc:AlternateContent xmlns:mc="http://schemas.openxmlformats.org/markup-compatibility/2006" xmlns:a14="http://schemas.microsoft.com/office/drawing/2010/main">
+        <mc:Choice Requires="a14">
           <p:sp>
             <p:nvSpPr>
               <p:cNvPr id="3" name="Content Placeholder 2">
@@ -5768,7 +5824,7 @@
             </p:txBody>
           </p:sp>
         </mc:Choice>
-        <mc:Fallback>
+        <mc:Fallback xmlns="">
           <p:sp>
             <p:nvSpPr>
               <p:cNvPr id="3" name="Content Placeholder 2">
@@ -5866,8 +5922,8 @@
           </a:p>
         </p:txBody>
       </p:sp>
-      <mc:AlternateContent xmlns:mc="http://schemas.openxmlformats.org/markup-compatibility/2006">
-        <mc:Choice xmlns:a14="http://schemas.microsoft.com/office/drawing/2010/main" Requires="a14">
+      <mc:AlternateContent xmlns:mc="http://schemas.openxmlformats.org/markup-compatibility/2006" xmlns:a14="http://schemas.microsoft.com/office/drawing/2010/main">
+        <mc:Choice Requires="a14">
           <p:sp>
             <p:nvSpPr>
               <p:cNvPr id="3" name="Content Placeholder 2">
@@ -6213,7 +6269,7 @@
             </p:txBody>
           </p:sp>
         </mc:Choice>
-        <mc:Fallback>
+        <mc:Fallback xmlns="">
           <p:sp>
             <p:nvSpPr>
               <p:cNvPr id="3" name="Content Placeholder 2">
@@ -6311,8 +6367,8 @@
           </a:p>
         </p:txBody>
       </p:sp>
-      <mc:AlternateContent xmlns:mc="http://schemas.openxmlformats.org/markup-compatibility/2006">
-        <mc:Choice xmlns:a14="http://schemas.microsoft.com/office/drawing/2010/main" Requires="a14">
+      <mc:AlternateContent xmlns:mc="http://schemas.openxmlformats.org/markup-compatibility/2006" xmlns:a14="http://schemas.microsoft.com/office/drawing/2010/main">
+        <mc:Choice Requires="a14">
           <p:sp>
             <p:nvSpPr>
               <p:cNvPr id="3" name="Content Placeholder 2">
@@ -6700,7 +6756,7 @@
             </p:txBody>
           </p:sp>
         </mc:Choice>
-        <mc:Fallback>
+        <mc:Fallback xmlns="">
           <p:sp>
             <p:nvSpPr>
               <p:cNvPr id="3" name="Content Placeholder 2">

</xml_diff>